<commit_message>
Add Cypress code coverage support
- Integrated `@cypress/code-coverage` plugin to enable test coverage reports.
- Updated `cypress.config.js` for code coverage task setup.
- Modified `e2e.js` to include code coverage support.
- Updated `package-lock.json` with necessary dependency additions and version updates.
</commit_message>
<xml_diff>
--- a/doc/ai/presentation/SoftwareEntwicklungAI.pptx
+++ b/doc/ai/presentation/SoftwareEntwicklungAI.pptx
@@ -8774,7 +8774,7 @@
         </p:nvSpPr>
         <p:spPr>
           <a:xfrm>
-            <a:off x="-1" y="69364"/>
+            <a:off x="315865" y="2645659"/>
             <a:ext cx="12855575" cy="2280136"/>
           </a:xfrm>
           <a:prstGeom prst="rect">
@@ -8843,7 +8843,7 @@
         </p:nvSpPr>
         <p:spPr>
           <a:xfrm>
-            <a:off x="1067816" y="1209432"/>
+            <a:off x="2424343" y="1328725"/>
             <a:ext cx="10908284" cy="869950"/>
           </a:xfrm>
         </p:spPr>
@@ -8874,7 +8874,12 @@
             <p:ph type="subTitle" idx="10"/>
           </p:nvPr>
         </p:nvSpPr>
-        <p:spPr/>
+        <p:spPr>
+          <a:xfrm>
+            <a:off x="1732682" y="308686"/>
+            <a:ext cx="9087875" cy="245365"/>
+          </a:xfrm>
+        </p:spPr>
         <p:txBody>
           <a:bodyPr/>
           <a:lstStyle/>
@@ -8905,7 +8910,12 @@
             <p:ph type="body" sz="quarter" idx="11"/>
           </p:nvPr>
         </p:nvSpPr>
-        <p:spPr/>
+        <p:spPr>
+          <a:xfrm>
+            <a:off x="1602053" y="636376"/>
+            <a:ext cx="9087875" cy="245365"/>
+          </a:xfrm>
+        </p:spPr>
         <p:txBody>
           <a:bodyPr/>
           <a:lstStyle/>

</xml_diff>